<commit_message>
flip find_variables <> find_terms
</commit_message>
<xml_diff>
--- a/paper/figure2.pptx
+++ b/paper/figure2.pptx
@@ -245,7 +245,7 @@
           <a:p>
             <a:fld id="{EAE26A23-80F6-4131-8DB8-2F8856A3F01B}" type="datetimeFigureOut">
               <a:rPr lang="en-GB" smtClean="0"/>
-              <a:t>11/05/2019</a:t>
+              <a:t>19/06/2019</a:t>
             </a:fld>
             <a:endParaRPr lang="en-GB"/>
           </a:p>
@@ -415,7 +415,7 @@
           <a:p>
             <a:fld id="{EAE26A23-80F6-4131-8DB8-2F8856A3F01B}" type="datetimeFigureOut">
               <a:rPr lang="en-GB" smtClean="0"/>
-              <a:t>11/05/2019</a:t>
+              <a:t>19/06/2019</a:t>
             </a:fld>
             <a:endParaRPr lang="en-GB"/>
           </a:p>
@@ -595,7 +595,7 @@
           <a:p>
             <a:fld id="{EAE26A23-80F6-4131-8DB8-2F8856A3F01B}" type="datetimeFigureOut">
               <a:rPr lang="en-GB" smtClean="0"/>
-              <a:t>11/05/2019</a:t>
+              <a:t>19/06/2019</a:t>
             </a:fld>
             <a:endParaRPr lang="en-GB"/>
           </a:p>
@@ -765,7 +765,7 @@
           <a:p>
             <a:fld id="{EAE26A23-80F6-4131-8DB8-2F8856A3F01B}" type="datetimeFigureOut">
               <a:rPr lang="en-GB" smtClean="0"/>
-              <a:t>11/05/2019</a:t>
+              <a:t>19/06/2019</a:t>
             </a:fld>
             <a:endParaRPr lang="en-GB"/>
           </a:p>
@@ -1011,7 +1011,7 @@
           <a:p>
             <a:fld id="{EAE26A23-80F6-4131-8DB8-2F8856A3F01B}" type="datetimeFigureOut">
               <a:rPr lang="en-GB" smtClean="0"/>
-              <a:t>11/05/2019</a:t>
+              <a:t>19/06/2019</a:t>
             </a:fld>
             <a:endParaRPr lang="en-GB"/>
           </a:p>
@@ -1243,7 +1243,7 @@
           <a:p>
             <a:fld id="{EAE26A23-80F6-4131-8DB8-2F8856A3F01B}" type="datetimeFigureOut">
               <a:rPr lang="en-GB" smtClean="0"/>
-              <a:t>11/05/2019</a:t>
+              <a:t>19/06/2019</a:t>
             </a:fld>
             <a:endParaRPr lang="en-GB"/>
           </a:p>
@@ -1610,7 +1610,7 @@
           <a:p>
             <a:fld id="{EAE26A23-80F6-4131-8DB8-2F8856A3F01B}" type="datetimeFigureOut">
               <a:rPr lang="en-GB" smtClean="0"/>
-              <a:t>11/05/2019</a:t>
+              <a:t>19/06/2019</a:t>
             </a:fld>
             <a:endParaRPr lang="en-GB"/>
           </a:p>
@@ -1728,7 +1728,7 @@
           <a:p>
             <a:fld id="{EAE26A23-80F6-4131-8DB8-2F8856A3F01B}" type="datetimeFigureOut">
               <a:rPr lang="en-GB" smtClean="0"/>
-              <a:t>11/05/2019</a:t>
+              <a:t>19/06/2019</a:t>
             </a:fld>
             <a:endParaRPr lang="en-GB"/>
           </a:p>
@@ -1823,7 +1823,7 @@
           <a:p>
             <a:fld id="{EAE26A23-80F6-4131-8DB8-2F8856A3F01B}" type="datetimeFigureOut">
               <a:rPr lang="en-GB" smtClean="0"/>
-              <a:t>11/05/2019</a:t>
+              <a:t>19/06/2019</a:t>
             </a:fld>
             <a:endParaRPr lang="en-GB"/>
           </a:p>
@@ -2100,7 +2100,7 @@
           <a:p>
             <a:fld id="{EAE26A23-80F6-4131-8DB8-2F8856A3F01B}" type="datetimeFigureOut">
               <a:rPr lang="en-GB" smtClean="0"/>
-              <a:t>11/05/2019</a:t>
+              <a:t>19/06/2019</a:t>
             </a:fld>
             <a:endParaRPr lang="en-GB"/>
           </a:p>
@@ -2357,7 +2357,7 @@
           <a:p>
             <a:fld id="{EAE26A23-80F6-4131-8DB8-2F8856A3F01B}" type="datetimeFigureOut">
               <a:rPr lang="en-GB" smtClean="0"/>
-              <a:t>11/05/2019</a:t>
+              <a:t>19/06/2019</a:t>
             </a:fld>
             <a:endParaRPr lang="en-GB"/>
           </a:p>
@@ -2570,7 +2570,7 @@
           <a:p>
             <a:fld id="{EAE26A23-80F6-4131-8DB8-2F8856A3F01B}" type="datetimeFigureOut">
               <a:rPr lang="en-GB" smtClean="0"/>
-              <a:t>11/05/2019</a:t>
+              <a:t>19/06/2019</a:t>
             </a:fld>
             <a:endParaRPr lang="en-GB"/>
           </a:p>
@@ -4998,8 +4998,8 @@
         </p:nvSpPr>
         <p:spPr>
           <a:xfrm>
-            <a:off x="9263386" y="3096519"/>
-            <a:ext cx="5416868" cy="707886"/>
+            <a:off x="9767237" y="3082214"/>
+            <a:ext cx="4083169" cy="707886"/>
           </a:xfrm>
           <a:prstGeom prst="rect">
             <a:avLst/>
@@ -5016,7 +5016,7 @@
                 <a:latin typeface="Fira Code" panose="020B0509050000020004" pitchFamily="49" charset="0"/>
                 <a:ea typeface="Fira Code" panose="020B0509050000020004" pitchFamily="49" charset="0"/>
               </a:rPr>
-              <a:t>find_variables</a:t>
+              <a:t>find_terms</a:t>
             </a:r>
             <a:r>
               <a:rPr lang="en-GB" sz="4000" dirty="0">
@@ -5102,7 +5102,7 @@
         <p:spPr>
           <a:xfrm>
             <a:off x="4087982" y="3082214"/>
-            <a:ext cx="3877985" cy="707886"/>
+            <a:ext cx="5109091" cy="707886"/>
           </a:xfrm>
           <a:prstGeom prst="rect">
             <a:avLst/>
@@ -5122,7 +5122,7 @@
                 <a:latin typeface="Fira Code" panose="020B0509050000020004" pitchFamily="49" charset="0"/>
                 <a:ea typeface="Fira Code" panose="020B0509050000020004" pitchFamily="49" charset="0"/>
               </a:rPr>
-              <a:t>find_terms</a:t>
+              <a:t>find_variables</a:t>
             </a:r>
             <a:r>
               <a:rPr lang="en-GB" sz="4000" dirty="0">

</xml_diff>

<commit_message>
set groups visually apart
</commit_message>
<xml_diff>
--- a/paper/figure2.pptx
+++ b/paper/figure2.pptx
@@ -7,7 +7,11 @@
   <p:sldIdLst>
     <p:sldId id="256" r:id="rId2"/>
     <p:sldId id="257" r:id="rId3"/>
-    <p:sldId id="258" r:id="rId4"/>
+    <p:sldId id="262" r:id="rId4"/>
+    <p:sldId id="259" r:id="rId5"/>
+    <p:sldId id="258" r:id="rId6"/>
+    <p:sldId id="260" r:id="rId7"/>
+    <p:sldId id="261" r:id="rId8"/>
   </p:sldIdLst>
   <p:sldSz cx="24120475" cy="13679488"/>
   <p:notesSz cx="6858000" cy="9144000"/>
@@ -245,7 +249,7 @@
           <a:p>
             <a:fld id="{EAE26A23-80F6-4131-8DB8-2F8856A3F01B}" type="datetimeFigureOut">
               <a:rPr lang="en-GB" smtClean="0"/>
-              <a:t>19/06/2019</a:t>
+              <a:t>20/06/2019</a:t>
             </a:fld>
             <a:endParaRPr lang="en-GB"/>
           </a:p>
@@ -415,7 +419,7 @@
           <a:p>
             <a:fld id="{EAE26A23-80F6-4131-8DB8-2F8856A3F01B}" type="datetimeFigureOut">
               <a:rPr lang="en-GB" smtClean="0"/>
-              <a:t>19/06/2019</a:t>
+              <a:t>20/06/2019</a:t>
             </a:fld>
             <a:endParaRPr lang="en-GB"/>
           </a:p>
@@ -595,7 +599,7 @@
           <a:p>
             <a:fld id="{EAE26A23-80F6-4131-8DB8-2F8856A3F01B}" type="datetimeFigureOut">
               <a:rPr lang="en-GB" smtClean="0"/>
-              <a:t>19/06/2019</a:t>
+              <a:t>20/06/2019</a:t>
             </a:fld>
             <a:endParaRPr lang="en-GB"/>
           </a:p>
@@ -765,7 +769,7 @@
           <a:p>
             <a:fld id="{EAE26A23-80F6-4131-8DB8-2F8856A3F01B}" type="datetimeFigureOut">
               <a:rPr lang="en-GB" smtClean="0"/>
-              <a:t>19/06/2019</a:t>
+              <a:t>20/06/2019</a:t>
             </a:fld>
             <a:endParaRPr lang="en-GB"/>
           </a:p>
@@ -1011,7 +1015,7 @@
           <a:p>
             <a:fld id="{EAE26A23-80F6-4131-8DB8-2F8856A3F01B}" type="datetimeFigureOut">
               <a:rPr lang="en-GB" smtClean="0"/>
-              <a:t>19/06/2019</a:t>
+              <a:t>20/06/2019</a:t>
             </a:fld>
             <a:endParaRPr lang="en-GB"/>
           </a:p>
@@ -1243,7 +1247,7 @@
           <a:p>
             <a:fld id="{EAE26A23-80F6-4131-8DB8-2F8856A3F01B}" type="datetimeFigureOut">
               <a:rPr lang="en-GB" smtClean="0"/>
-              <a:t>19/06/2019</a:t>
+              <a:t>20/06/2019</a:t>
             </a:fld>
             <a:endParaRPr lang="en-GB"/>
           </a:p>
@@ -1610,7 +1614,7 @@
           <a:p>
             <a:fld id="{EAE26A23-80F6-4131-8DB8-2F8856A3F01B}" type="datetimeFigureOut">
               <a:rPr lang="en-GB" smtClean="0"/>
-              <a:t>19/06/2019</a:t>
+              <a:t>20/06/2019</a:t>
             </a:fld>
             <a:endParaRPr lang="en-GB"/>
           </a:p>
@@ -1728,7 +1732,7 @@
           <a:p>
             <a:fld id="{EAE26A23-80F6-4131-8DB8-2F8856A3F01B}" type="datetimeFigureOut">
               <a:rPr lang="en-GB" smtClean="0"/>
-              <a:t>19/06/2019</a:t>
+              <a:t>20/06/2019</a:t>
             </a:fld>
             <a:endParaRPr lang="en-GB"/>
           </a:p>
@@ -1823,7 +1827,7 @@
           <a:p>
             <a:fld id="{EAE26A23-80F6-4131-8DB8-2F8856A3F01B}" type="datetimeFigureOut">
               <a:rPr lang="en-GB" smtClean="0"/>
-              <a:t>19/06/2019</a:t>
+              <a:t>20/06/2019</a:t>
             </a:fld>
             <a:endParaRPr lang="en-GB"/>
           </a:p>
@@ -2100,7 +2104,7 @@
           <a:p>
             <a:fld id="{EAE26A23-80F6-4131-8DB8-2F8856A3F01B}" type="datetimeFigureOut">
               <a:rPr lang="en-GB" smtClean="0"/>
-              <a:t>19/06/2019</a:t>
+              <a:t>20/06/2019</a:t>
             </a:fld>
             <a:endParaRPr lang="en-GB"/>
           </a:p>
@@ -2357,7 +2361,7 @@
           <a:p>
             <a:fld id="{EAE26A23-80F6-4131-8DB8-2F8856A3F01B}" type="datetimeFigureOut">
               <a:rPr lang="en-GB" smtClean="0"/>
-              <a:t>19/06/2019</a:t>
+              <a:t>20/06/2019</a:t>
             </a:fld>
             <a:endParaRPr lang="en-GB"/>
           </a:p>
@@ -2570,7 +2574,7 @@
           <a:p>
             <a:fld id="{EAE26A23-80F6-4131-8DB8-2F8856A3F01B}" type="datetimeFigureOut">
               <a:rPr lang="en-GB" smtClean="0"/>
-              <a:t>19/06/2019</a:t>
+              <a:t>20/06/2019</a:t>
             </a:fld>
             <a:endParaRPr lang="en-GB"/>
           </a:p>
@@ -4840,6 +4844,429 @@
       </p:grpSpPr>
       <p:sp>
         <p:nvSpPr>
+          <p:cNvPr id="4" name="TextBox 3">
+            <a:extLst>
+              <a:ext uri="{FF2B5EF4-FFF2-40B4-BE49-F238E27FC236}">
+                <a16:creationId xmlns:a16="http://schemas.microsoft.com/office/drawing/2014/main" id="{04A94E3E-52C4-4E9E-B37B-F81853CABCC2}"/>
+              </a:ext>
+            </a:extLst>
+          </p:cNvPr>
+          <p:cNvSpPr txBox="1"/>
+          <p:nvPr/>
+        </p:nvSpPr>
+        <p:spPr>
+          <a:xfrm>
+            <a:off x="1993617" y="1384663"/>
+            <a:ext cx="20133267" cy="1107996"/>
+          </a:xfrm>
+          <a:prstGeom prst="rect">
+            <a:avLst/>
+          </a:prstGeom>
+          <a:noFill/>
+        </p:spPr>
+        <p:txBody>
+          <a:bodyPr wrap="square" rtlCol="0">
+            <a:spAutoFit/>
+          </a:bodyPr>
+          <a:lstStyle/>
+          <a:p>
+            <a:pPr algn="ctr"/>
+            <a:r>
+              <a:rPr lang="en-GB" sz="6600" dirty="0">
+                <a:latin typeface="Fira Code" panose="020B0509050000020004" pitchFamily="49" charset="0"/>
+                <a:ea typeface="Fira Code" panose="020B0509050000020004" pitchFamily="49" charset="0"/>
+              </a:rPr>
+              <a:t>model(y ~ x1 + x2 + (</a:t>
+            </a:r>
+            <a:r>
+              <a:rPr lang="en-GB" sz="6600" dirty="0" err="1">
+                <a:solidFill>
+                  <a:srgbClr val="00B050"/>
+                </a:solidFill>
+                <a:latin typeface="Fira Code" panose="020B0509050000020004" pitchFamily="49" charset="0"/>
+                <a:ea typeface="Fira Code" panose="020B0509050000020004" pitchFamily="49" charset="0"/>
+              </a:rPr>
+              <a:t>rs</a:t>
+            </a:r>
+            <a:r>
+              <a:rPr lang="en-GB" sz="6600" dirty="0">
+                <a:solidFill>
+                  <a:srgbClr val="F44336"/>
+                </a:solidFill>
+                <a:latin typeface="Fira Code" panose="020B0509050000020004" pitchFamily="49" charset="0"/>
+                <a:ea typeface="Fira Code" panose="020B0509050000020004" pitchFamily="49" charset="0"/>
+              </a:rPr>
+              <a:t> </a:t>
+            </a:r>
+            <a:r>
+              <a:rPr lang="en-GB" sz="6600" dirty="0">
+                <a:latin typeface="Fira Code" panose="020B0509050000020004" pitchFamily="49" charset="0"/>
+                <a:ea typeface="Fira Code" panose="020B0509050000020004" pitchFamily="49" charset="0"/>
+              </a:rPr>
+              <a:t>|</a:t>
+            </a:r>
+            <a:r>
+              <a:rPr lang="en-GB" sz="6600" dirty="0">
+                <a:solidFill>
+                  <a:srgbClr val="F44336"/>
+                </a:solidFill>
+                <a:latin typeface="Fira Code" panose="020B0509050000020004" pitchFamily="49" charset="0"/>
+                <a:ea typeface="Fira Code" panose="020B0509050000020004" pitchFamily="49" charset="0"/>
+              </a:rPr>
+              <a:t> g</a:t>
+            </a:r>
+            <a:r>
+              <a:rPr lang="en-GB" sz="6600" dirty="0">
+                <a:latin typeface="Fira Code" panose="020B0509050000020004" pitchFamily="49" charset="0"/>
+                <a:ea typeface="Fira Code" panose="020B0509050000020004" pitchFamily="49" charset="0"/>
+              </a:rPr>
+              <a:t>), data)</a:t>
+            </a:r>
+          </a:p>
+        </p:txBody>
+      </p:sp>
+      <p:sp>
+        <p:nvSpPr>
+          <p:cNvPr id="21" name="Rechteck 20">
+            <a:extLst>
+              <a:ext uri="{FF2B5EF4-FFF2-40B4-BE49-F238E27FC236}">
+                <a16:creationId xmlns:a16="http://schemas.microsoft.com/office/drawing/2014/main" id="{0FB5D278-CEEF-445C-BF1E-6983372ECB2E}"/>
+              </a:ext>
+            </a:extLst>
+          </p:cNvPr>
+          <p:cNvSpPr/>
+          <p:nvPr/>
+        </p:nvSpPr>
+        <p:spPr>
+          <a:xfrm>
+            <a:off x="8182625" y="2542254"/>
+            <a:ext cx="6949338" cy="769441"/>
+          </a:xfrm>
+          <a:prstGeom prst="rect">
+            <a:avLst/>
+          </a:prstGeom>
+        </p:spPr>
+        <p:txBody>
+          <a:bodyPr wrap="none">
+            <a:spAutoFit/>
+          </a:bodyPr>
+          <a:lstStyle/>
+          <a:p>
+            <a:r>
+              <a:rPr lang="en-GB" sz="4400" dirty="0" err="1">
+                <a:solidFill>
+                  <a:srgbClr val="00B050"/>
+                </a:solidFill>
+                <a:latin typeface="Fira Code" panose="020B0509050000020004" pitchFamily="49" charset="0"/>
+                <a:ea typeface="Fira Code" panose="020B0509050000020004" pitchFamily="49" charset="0"/>
+              </a:rPr>
+              <a:t>find_random_slopes</a:t>
+            </a:r>
+            <a:r>
+              <a:rPr lang="en-GB" sz="4400" dirty="0">
+                <a:solidFill>
+                  <a:srgbClr val="00B050"/>
+                </a:solidFill>
+                <a:latin typeface="Fira Code" panose="020B0509050000020004" pitchFamily="49" charset="0"/>
+                <a:ea typeface="Fira Code" panose="020B0509050000020004" pitchFamily="49" charset="0"/>
+              </a:rPr>
+              <a:t>()</a:t>
+            </a:r>
+          </a:p>
+        </p:txBody>
+      </p:sp>
+      <p:sp>
+        <p:nvSpPr>
+          <p:cNvPr id="22" name="Rechteck 21">
+            <a:extLst>
+              <a:ext uri="{FF2B5EF4-FFF2-40B4-BE49-F238E27FC236}">
+                <a16:creationId xmlns:a16="http://schemas.microsoft.com/office/drawing/2014/main" id="{3D312BFE-4CD4-470E-9347-A689B4A0A686}"/>
+              </a:ext>
+            </a:extLst>
+          </p:cNvPr>
+          <p:cNvSpPr/>
+          <p:nvPr/>
+        </p:nvSpPr>
+        <p:spPr>
+          <a:xfrm>
+            <a:off x="16205090" y="2542254"/>
+            <a:ext cx="4581703" cy="769441"/>
+          </a:xfrm>
+          <a:prstGeom prst="rect">
+            <a:avLst/>
+          </a:prstGeom>
+        </p:spPr>
+        <p:txBody>
+          <a:bodyPr wrap="none">
+            <a:spAutoFit/>
+          </a:bodyPr>
+          <a:lstStyle/>
+          <a:p>
+            <a:r>
+              <a:rPr lang="en-GB" sz="4400" dirty="0" err="1">
+                <a:solidFill>
+                  <a:srgbClr val="F44336"/>
+                </a:solidFill>
+                <a:latin typeface="Fira Code" panose="020B0509050000020004" pitchFamily="49" charset="0"/>
+                <a:ea typeface="Fira Code" panose="020B0509050000020004" pitchFamily="49" charset="0"/>
+              </a:rPr>
+              <a:t>find_random</a:t>
+            </a:r>
+            <a:r>
+              <a:rPr lang="en-GB" sz="4400" dirty="0">
+                <a:solidFill>
+                  <a:srgbClr val="F44336"/>
+                </a:solidFill>
+                <a:latin typeface="Fira Code" panose="020B0509050000020004" pitchFamily="49" charset="0"/>
+                <a:ea typeface="Fira Code" panose="020B0509050000020004" pitchFamily="49" charset="0"/>
+              </a:rPr>
+              <a:t>()</a:t>
+            </a:r>
+          </a:p>
+        </p:txBody>
+      </p:sp>
+    </p:spTree>
+    <p:extLst>
+      <p:ext uri="{BB962C8B-B14F-4D97-AF65-F5344CB8AC3E}">
+        <p14:creationId xmlns:p14="http://schemas.microsoft.com/office/powerpoint/2010/main" val="1975316119"/>
+      </p:ext>
+    </p:extLst>
+  </p:cSld>
+  <p:clrMapOvr>
+    <a:masterClrMapping/>
+  </p:clrMapOvr>
+</p:sld>
+</file>
+
+<file path=ppt/slides/slide4.xml><?xml version="1.0" encoding="utf-8"?>
+<p:sld xmlns:a="http://schemas.openxmlformats.org/drawingml/2006/main" xmlns:r="http://schemas.openxmlformats.org/officeDocument/2006/relationships" xmlns:p="http://schemas.openxmlformats.org/presentationml/2006/main">
+  <p:cSld>
+    <p:spTree>
+      <p:nvGrpSpPr>
+        <p:cNvPr id="1" name=""/>
+        <p:cNvGrpSpPr/>
+        <p:nvPr/>
+      </p:nvGrpSpPr>
+      <p:grpSpPr>
+        <a:xfrm>
+          <a:off x="0" y="0"/>
+          <a:ext cx="0" cy="0"/>
+          <a:chOff x="0" y="0"/>
+          <a:chExt cx="0" cy="0"/>
+        </a:xfrm>
+      </p:grpSpPr>
+      <p:sp>
+        <p:nvSpPr>
+          <p:cNvPr id="4" name="TextBox 3">
+            <a:extLst>
+              <a:ext uri="{FF2B5EF4-FFF2-40B4-BE49-F238E27FC236}">
+                <a16:creationId xmlns:a16="http://schemas.microsoft.com/office/drawing/2014/main" id="{04A94E3E-52C4-4E9E-B37B-F81853CABCC2}"/>
+              </a:ext>
+            </a:extLst>
+          </p:cNvPr>
+          <p:cNvSpPr txBox="1"/>
+          <p:nvPr/>
+        </p:nvSpPr>
+        <p:spPr>
+          <a:xfrm>
+            <a:off x="1993617" y="1384663"/>
+            <a:ext cx="20133267" cy="1107996"/>
+          </a:xfrm>
+          <a:prstGeom prst="rect">
+            <a:avLst/>
+          </a:prstGeom>
+          <a:noFill/>
+        </p:spPr>
+        <p:txBody>
+          <a:bodyPr wrap="square" rtlCol="0">
+            <a:spAutoFit/>
+          </a:bodyPr>
+          <a:lstStyle/>
+          <a:p>
+            <a:pPr algn="ctr"/>
+            <a:r>
+              <a:rPr lang="en-GB" sz="6600" dirty="0">
+                <a:latin typeface="Fira Code" panose="020B0509050000020004" pitchFamily="49" charset="0"/>
+                <a:ea typeface="Fira Code" panose="020B0509050000020004" pitchFamily="49" charset="0"/>
+              </a:rPr>
+              <a:t>model(</a:t>
+            </a:r>
+            <a:r>
+              <a:rPr lang="en-GB" sz="6600" dirty="0">
+                <a:solidFill>
+                  <a:srgbClr val="00B050"/>
+                </a:solidFill>
+                <a:latin typeface="Fira Code" panose="020B0509050000020004" pitchFamily="49" charset="0"/>
+                <a:ea typeface="Fira Code" panose="020B0509050000020004" pitchFamily="49" charset="0"/>
+              </a:rPr>
+              <a:t>y</a:t>
+            </a:r>
+            <a:r>
+              <a:rPr lang="en-GB" sz="6600" dirty="0">
+                <a:solidFill>
+                  <a:srgbClr val="F44336"/>
+                </a:solidFill>
+                <a:latin typeface="Fira Code" panose="020B0509050000020004" pitchFamily="49" charset="0"/>
+                <a:ea typeface="Fira Code" panose="020B0509050000020004" pitchFamily="49" charset="0"/>
+              </a:rPr>
+              <a:t> ~ x1 + x2 + </a:t>
+            </a:r>
+            <a:r>
+              <a:rPr lang="en-GB" sz="6600" dirty="0">
+                <a:latin typeface="Fira Code" panose="020B0509050000020004" pitchFamily="49" charset="0"/>
+                <a:ea typeface="Fira Code" panose="020B0509050000020004" pitchFamily="49" charset="0"/>
+              </a:rPr>
+              <a:t>(</a:t>
+            </a:r>
+            <a:r>
+              <a:rPr lang="en-GB" sz="6600" dirty="0" err="1">
+                <a:latin typeface="Fira Code" panose="020B0509050000020004" pitchFamily="49" charset="0"/>
+                <a:ea typeface="Fira Code" panose="020B0509050000020004" pitchFamily="49" charset="0"/>
+              </a:rPr>
+              <a:t>rs</a:t>
+            </a:r>
+            <a:r>
+              <a:rPr lang="en-GB" sz="6600" dirty="0">
+                <a:latin typeface="Fira Code" panose="020B0509050000020004" pitchFamily="49" charset="0"/>
+                <a:ea typeface="Fira Code" panose="020B0509050000020004" pitchFamily="49" charset="0"/>
+              </a:rPr>
+              <a:t> | g), data)</a:t>
+            </a:r>
+          </a:p>
+        </p:txBody>
+      </p:sp>
+      <p:sp>
+        <p:nvSpPr>
+          <p:cNvPr id="2" name="Rechteck 1">
+            <a:extLst>
+              <a:ext uri="{FF2B5EF4-FFF2-40B4-BE49-F238E27FC236}">
+                <a16:creationId xmlns:a16="http://schemas.microsoft.com/office/drawing/2014/main" id="{5A95353C-DE3B-47C7-9D5F-A404E9A6CAB0}"/>
+              </a:ext>
+            </a:extLst>
+          </p:cNvPr>
+          <p:cNvSpPr/>
+          <p:nvPr/>
+        </p:nvSpPr>
+        <p:spPr>
+          <a:xfrm>
+            <a:off x="4096314" y="2492659"/>
+            <a:ext cx="5258171" cy="769441"/>
+          </a:xfrm>
+          <a:prstGeom prst="rect">
+            <a:avLst/>
+          </a:prstGeom>
+        </p:spPr>
+        <p:txBody>
+          <a:bodyPr wrap="none">
+            <a:spAutoFit/>
+          </a:bodyPr>
+          <a:lstStyle/>
+          <a:p>
+            <a:r>
+              <a:rPr lang="en-GB" sz="4400" dirty="0" err="1">
+                <a:solidFill>
+                  <a:srgbClr val="00B050"/>
+                </a:solidFill>
+                <a:latin typeface="Fira Code" panose="020B0509050000020004" pitchFamily="49" charset="0"/>
+                <a:ea typeface="Fira Code" panose="020B0509050000020004" pitchFamily="49" charset="0"/>
+              </a:rPr>
+              <a:t>find_response</a:t>
+            </a:r>
+            <a:r>
+              <a:rPr lang="en-GB" sz="4400" dirty="0">
+                <a:solidFill>
+                  <a:srgbClr val="00B050"/>
+                </a:solidFill>
+                <a:latin typeface="Fira Code" panose="020B0509050000020004" pitchFamily="49" charset="0"/>
+                <a:ea typeface="Fira Code" panose="020B0509050000020004" pitchFamily="49" charset="0"/>
+              </a:rPr>
+              <a:t>()</a:t>
+            </a:r>
+          </a:p>
+        </p:txBody>
+      </p:sp>
+      <p:sp>
+        <p:nvSpPr>
+          <p:cNvPr id="20" name="Rechteck 19">
+            <a:extLst>
+              <a:ext uri="{FF2B5EF4-FFF2-40B4-BE49-F238E27FC236}">
+                <a16:creationId xmlns:a16="http://schemas.microsoft.com/office/drawing/2014/main" id="{A8647EF2-5E22-4234-991D-4513951632F3}"/>
+              </a:ext>
+            </a:extLst>
+          </p:cNvPr>
+          <p:cNvSpPr/>
+          <p:nvPr/>
+        </p:nvSpPr>
+        <p:spPr>
+          <a:xfrm>
+            <a:off x="9553294" y="2492659"/>
+            <a:ext cx="5934638" cy="769441"/>
+          </a:xfrm>
+          <a:prstGeom prst="rect">
+            <a:avLst/>
+          </a:prstGeom>
+        </p:spPr>
+        <p:txBody>
+          <a:bodyPr wrap="none">
+            <a:spAutoFit/>
+          </a:bodyPr>
+          <a:lstStyle/>
+          <a:p>
+            <a:r>
+              <a:rPr lang="en-GB" sz="4400" dirty="0" err="1">
+                <a:solidFill>
+                  <a:srgbClr val="F44336"/>
+                </a:solidFill>
+                <a:latin typeface="Fira Code" panose="020B0509050000020004" pitchFamily="49" charset="0"/>
+                <a:ea typeface="Fira Code" panose="020B0509050000020004" pitchFamily="49" charset="0"/>
+              </a:rPr>
+              <a:t>find_predictors</a:t>
+            </a:r>
+            <a:r>
+              <a:rPr lang="en-GB" sz="4400" dirty="0">
+                <a:solidFill>
+                  <a:srgbClr val="F44336"/>
+                </a:solidFill>
+                <a:latin typeface="Fira Code" panose="020B0509050000020004" pitchFamily="49" charset="0"/>
+                <a:ea typeface="Fira Code" panose="020B0509050000020004" pitchFamily="49" charset="0"/>
+              </a:rPr>
+              <a:t>()</a:t>
+            </a:r>
+          </a:p>
+        </p:txBody>
+      </p:sp>
+    </p:spTree>
+    <p:extLst>
+      <p:ext uri="{BB962C8B-B14F-4D97-AF65-F5344CB8AC3E}">
+        <p14:creationId xmlns:p14="http://schemas.microsoft.com/office/powerpoint/2010/main" val="2628970299"/>
+      </p:ext>
+    </p:extLst>
+  </p:cSld>
+  <p:clrMapOvr>
+    <a:masterClrMapping/>
+  </p:clrMapOvr>
+</p:sld>
+</file>
+
+<file path=ppt/slides/slide5.xml><?xml version="1.0" encoding="utf-8"?>
+<p:sld xmlns:a="http://schemas.openxmlformats.org/drawingml/2006/main" xmlns:r="http://schemas.openxmlformats.org/officeDocument/2006/relationships" xmlns:p="http://schemas.openxmlformats.org/presentationml/2006/main">
+  <p:cSld>
+    <p:spTree>
+      <p:nvGrpSpPr>
+        <p:cNvPr id="1" name=""/>
+        <p:cNvGrpSpPr/>
+        <p:nvPr/>
+      </p:nvGrpSpPr>
+      <p:grpSpPr>
+        <a:xfrm>
+          <a:off x="0" y="0"/>
+          <a:ext cx="0" cy="0"/>
+          <a:chOff x="0" y="0"/>
+          <a:chExt cx="0" cy="0"/>
+        </a:xfrm>
+      </p:grpSpPr>
+      <p:sp>
+        <p:nvSpPr>
           <p:cNvPr id="23" name="TextBox 3">
             <a:extLst>
               <a:ext uri="{FF2B5EF4-FFF2-40B4-BE49-F238E27FC236}">
@@ -5141,6 +5568,404 @@
     <p:extLst>
       <p:ext uri="{BB962C8B-B14F-4D97-AF65-F5344CB8AC3E}">
         <p14:creationId xmlns:p14="http://schemas.microsoft.com/office/powerpoint/2010/main" val="2675382396"/>
+      </p:ext>
+    </p:extLst>
+  </p:cSld>
+  <p:clrMapOvr>
+    <a:masterClrMapping/>
+  </p:clrMapOvr>
+</p:sld>
+</file>
+
+<file path=ppt/slides/slide6.xml><?xml version="1.0" encoding="utf-8"?>
+<p:sld xmlns:a="http://schemas.openxmlformats.org/drawingml/2006/main" xmlns:r="http://schemas.openxmlformats.org/officeDocument/2006/relationships" xmlns:p="http://schemas.openxmlformats.org/presentationml/2006/main">
+  <p:cSld>
+    <p:spTree>
+      <p:nvGrpSpPr>
+        <p:cNvPr id="1" name=""/>
+        <p:cNvGrpSpPr/>
+        <p:nvPr/>
+      </p:nvGrpSpPr>
+      <p:grpSpPr>
+        <a:xfrm>
+          <a:off x="0" y="0"/>
+          <a:ext cx="0" cy="0"/>
+          <a:chOff x="0" y="0"/>
+          <a:chExt cx="0" cy="0"/>
+        </a:xfrm>
+      </p:grpSpPr>
+      <p:sp>
+        <p:nvSpPr>
+          <p:cNvPr id="23" name="TextBox 3">
+            <a:extLst>
+              <a:ext uri="{FF2B5EF4-FFF2-40B4-BE49-F238E27FC236}">
+                <a16:creationId xmlns:a16="http://schemas.microsoft.com/office/drawing/2014/main" id="{52DD50C3-F918-4221-8A9A-53E3A28CB713}"/>
+              </a:ext>
+            </a:extLst>
+          </p:cNvPr>
+          <p:cNvSpPr txBox="1"/>
+          <p:nvPr/>
+        </p:nvSpPr>
+        <p:spPr>
+          <a:xfrm>
+            <a:off x="540237" y="712217"/>
+            <a:ext cx="23040000" cy="984885"/>
+          </a:xfrm>
+          <a:prstGeom prst="rect">
+            <a:avLst/>
+          </a:prstGeom>
+          <a:noFill/>
+        </p:spPr>
+        <p:txBody>
+          <a:bodyPr wrap="square" rtlCol="0">
+            <a:spAutoFit/>
+          </a:bodyPr>
+          <a:lstStyle/>
+          <a:p>
+            <a:pPr algn="ctr"/>
+            <a:r>
+              <a:rPr lang="en-GB" sz="5800" dirty="0">
+                <a:latin typeface="Fira Code" panose="020B0509050000020004" pitchFamily="49" charset="0"/>
+                <a:ea typeface="Fira Code" panose="020B0509050000020004" pitchFamily="49" charset="0"/>
+              </a:rPr>
+              <a:t>model(log(</a:t>
+            </a:r>
+            <a:r>
+              <a:rPr lang="en-GB" sz="5800" dirty="0">
+                <a:solidFill>
+                  <a:srgbClr val="F44336"/>
+                </a:solidFill>
+                <a:latin typeface="Fira Code" panose="020B0509050000020004" pitchFamily="49" charset="0"/>
+                <a:ea typeface="Fira Code" panose="020B0509050000020004" pitchFamily="49" charset="0"/>
+              </a:rPr>
+              <a:t>y</a:t>
+            </a:r>
+            <a:r>
+              <a:rPr lang="en-GB" sz="5800" dirty="0">
+                <a:latin typeface="Fira Code" panose="020B0509050000020004" pitchFamily="49" charset="0"/>
+                <a:ea typeface="Fira Code" panose="020B0509050000020004" pitchFamily="49" charset="0"/>
+              </a:rPr>
+              <a:t>) ~ </a:t>
+            </a:r>
+            <a:r>
+              <a:rPr lang="en-GB" sz="5800" dirty="0">
+                <a:solidFill>
+                  <a:srgbClr val="F44336"/>
+                </a:solidFill>
+                <a:latin typeface="Fira Code" panose="020B0509050000020004" pitchFamily="49" charset="0"/>
+                <a:ea typeface="Fira Code" panose="020B0509050000020004" pitchFamily="49" charset="0"/>
+              </a:rPr>
+              <a:t>x1</a:t>
+            </a:r>
+            <a:r>
+              <a:rPr lang="en-GB" sz="5800" dirty="0">
+                <a:latin typeface="Fira Code" panose="020B0509050000020004" pitchFamily="49" charset="0"/>
+                <a:ea typeface="Fira Code" panose="020B0509050000020004" pitchFamily="49" charset="0"/>
+              </a:rPr>
+              <a:t> + I(x1^2) + (x1 + </a:t>
+            </a:r>
+            <a:r>
+              <a:rPr lang="en-GB" sz="5800" dirty="0" err="1">
+                <a:solidFill>
+                  <a:srgbClr val="F44336"/>
+                </a:solidFill>
+                <a:latin typeface="Fira Code" panose="020B0509050000020004" pitchFamily="49" charset="0"/>
+                <a:ea typeface="Fira Code" panose="020B0509050000020004" pitchFamily="49" charset="0"/>
+              </a:rPr>
+              <a:t>rs</a:t>
+            </a:r>
+            <a:r>
+              <a:rPr lang="en-GB" sz="5800" dirty="0">
+                <a:latin typeface="Fira Code" panose="020B0509050000020004" pitchFamily="49" charset="0"/>
+                <a:ea typeface="Fira Code" panose="020B0509050000020004" pitchFamily="49" charset="0"/>
+              </a:rPr>
+              <a:t> | </a:t>
+            </a:r>
+            <a:r>
+              <a:rPr lang="en-GB" sz="5800" dirty="0">
+                <a:solidFill>
+                  <a:srgbClr val="F44336"/>
+                </a:solidFill>
+                <a:latin typeface="Fira Code" panose="020B0509050000020004" pitchFamily="49" charset="0"/>
+                <a:ea typeface="Fira Code" panose="020B0509050000020004" pitchFamily="49" charset="0"/>
+              </a:rPr>
+              <a:t>g</a:t>
+            </a:r>
+            <a:r>
+              <a:rPr lang="en-GB" sz="5800" dirty="0">
+                <a:latin typeface="Fira Code" panose="020B0509050000020004" pitchFamily="49" charset="0"/>
+                <a:ea typeface="Fira Code" panose="020B0509050000020004" pitchFamily="49" charset="0"/>
+              </a:rPr>
+              <a:t>), data)</a:t>
+            </a:r>
+          </a:p>
+        </p:txBody>
+      </p:sp>
+      <p:sp>
+        <p:nvSpPr>
+          <p:cNvPr id="37" name="Rechteck 36">
+            <a:extLst>
+              <a:ext uri="{FF2B5EF4-FFF2-40B4-BE49-F238E27FC236}">
+                <a16:creationId xmlns:a16="http://schemas.microsoft.com/office/drawing/2014/main" id="{BD7576E8-FEC8-4947-8FE0-F2679A7A2017}"/>
+              </a:ext>
+            </a:extLst>
+          </p:cNvPr>
+          <p:cNvSpPr/>
+          <p:nvPr/>
+        </p:nvSpPr>
+        <p:spPr>
+          <a:xfrm>
+            <a:off x="9262035" y="1914078"/>
+            <a:ext cx="5596404" cy="769441"/>
+          </a:xfrm>
+          <a:prstGeom prst="rect">
+            <a:avLst/>
+          </a:prstGeom>
+        </p:spPr>
+        <p:txBody>
+          <a:bodyPr wrap="none">
+            <a:spAutoFit/>
+          </a:bodyPr>
+          <a:lstStyle/>
+          <a:p>
+            <a:r>
+              <a:rPr lang="en-GB" sz="4400" dirty="0" err="1">
+                <a:solidFill>
+                  <a:srgbClr val="F44336"/>
+                </a:solidFill>
+                <a:latin typeface="Fira Code" panose="020B0509050000020004" pitchFamily="49" charset="0"/>
+                <a:ea typeface="Fira Code" panose="020B0509050000020004" pitchFamily="49" charset="0"/>
+              </a:rPr>
+              <a:t>find_variables</a:t>
+            </a:r>
+            <a:r>
+              <a:rPr lang="en-GB" sz="4400" dirty="0">
+                <a:solidFill>
+                  <a:srgbClr val="F44336"/>
+                </a:solidFill>
+                <a:latin typeface="Fira Code" panose="020B0509050000020004" pitchFamily="49" charset="0"/>
+                <a:ea typeface="Fira Code" panose="020B0509050000020004" pitchFamily="49" charset="0"/>
+              </a:rPr>
+              <a:t>()</a:t>
+            </a:r>
+          </a:p>
+        </p:txBody>
+      </p:sp>
+    </p:spTree>
+    <p:extLst>
+      <p:ext uri="{BB962C8B-B14F-4D97-AF65-F5344CB8AC3E}">
+        <p14:creationId xmlns:p14="http://schemas.microsoft.com/office/powerpoint/2010/main" val="3328845825"/>
+      </p:ext>
+    </p:extLst>
+  </p:cSld>
+  <p:clrMapOvr>
+    <a:masterClrMapping/>
+  </p:clrMapOvr>
+</p:sld>
+</file>
+
+<file path=ppt/slides/slide7.xml><?xml version="1.0" encoding="utf-8"?>
+<p:sld xmlns:a="http://schemas.openxmlformats.org/drawingml/2006/main" xmlns:r="http://schemas.openxmlformats.org/officeDocument/2006/relationships" xmlns:p="http://schemas.openxmlformats.org/presentationml/2006/main">
+  <p:cSld>
+    <p:spTree>
+      <p:nvGrpSpPr>
+        <p:cNvPr id="1" name=""/>
+        <p:cNvGrpSpPr/>
+        <p:nvPr/>
+      </p:nvGrpSpPr>
+      <p:grpSpPr>
+        <a:xfrm>
+          <a:off x="0" y="0"/>
+          <a:ext cx="0" cy="0"/>
+          <a:chOff x="0" y="0"/>
+          <a:chExt cx="0" cy="0"/>
+        </a:xfrm>
+      </p:grpSpPr>
+      <p:sp>
+        <p:nvSpPr>
+          <p:cNvPr id="23" name="TextBox 3">
+            <a:extLst>
+              <a:ext uri="{FF2B5EF4-FFF2-40B4-BE49-F238E27FC236}">
+                <a16:creationId xmlns:a16="http://schemas.microsoft.com/office/drawing/2014/main" id="{52DD50C3-F918-4221-8A9A-53E3A28CB713}"/>
+              </a:ext>
+            </a:extLst>
+          </p:cNvPr>
+          <p:cNvSpPr txBox="1"/>
+          <p:nvPr/>
+        </p:nvSpPr>
+        <p:spPr>
+          <a:xfrm>
+            <a:off x="540237" y="712217"/>
+            <a:ext cx="23040000" cy="984885"/>
+          </a:xfrm>
+          <a:prstGeom prst="rect">
+            <a:avLst/>
+          </a:prstGeom>
+          <a:noFill/>
+        </p:spPr>
+        <p:txBody>
+          <a:bodyPr wrap="square" rtlCol="0">
+            <a:spAutoFit/>
+          </a:bodyPr>
+          <a:lstStyle/>
+          <a:p>
+            <a:pPr algn="ctr"/>
+            <a:r>
+              <a:rPr lang="en-GB" sz="5800" dirty="0">
+                <a:latin typeface="Fira Code" panose="020B0509050000020004" pitchFamily="49" charset="0"/>
+                <a:ea typeface="Fira Code" panose="020B0509050000020004" pitchFamily="49" charset="0"/>
+              </a:rPr>
+              <a:t>model(</a:t>
+            </a:r>
+            <a:r>
+              <a:rPr lang="en-GB" sz="5800" dirty="0">
+                <a:solidFill>
+                  <a:srgbClr val="F44336"/>
+                </a:solidFill>
+                <a:latin typeface="Fira Code" panose="020B0509050000020004" pitchFamily="49" charset="0"/>
+                <a:ea typeface="Fira Code" panose="020B0509050000020004" pitchFamily="49" charset="0"/>
+              </a:rPr>
+              <a:t>log(y)</a:t>
+            </a:r>
+            <a:r>
+              <a:rPr lang="en-GB" sz="5800" dirty="0">
+                <a:latin typeface="Fira Code" panose="020B0509050000020004" pitchFamily="49" charset="0"/>
+                <a:ea typeface="Fira Code" panose="020B0509050000020004" pitchFamily="49" charset="0"/>
+              </a:rPr>
+              <a:t> ~ </a:t>
+            </a:r>
+            <a:r>
+              <a:rPr lang="en-GB" sz="5800" dirty="0">
+                <a:solidFill>
+                  <a:srgbClr val="F44336"/>
+                </a:solidFill>
+                <a:latin typeface="Fira Code" panose="020B0509050000020004" pitchFamily="49" charset="0"/>
+                <a:ea typeface="Fira Code" panose="020B0509050000020004" pitchFamily="49" charset="0"/>
+              </a:rPr>
+              <a:t>x1</a:t>
+            </a:r>
+            <a:r>
+              <a:rPr lang="en-GB" sz="5800" dirty="0">
+                <a:latin typeface="Fira Code" panose="020B0509050000020004" pitchFamily="49" charset="0"/>
+                <a:ea typeface="Fira Code" panose="020B0509050000020004" pitchFamily="49" charset="0"/>
+              </a:rPr>
+              <a:t> + </a:t>
+            </a:r>
+            <a:r>
+              <a:rPr lang="en-GB" sz="5800" dirty="0">
+                <a:solidFill>
+                  <a:srgbClr val="F44336"/>
+                </a:solidFill>
+                <a:latin typeface="Fira Code" panose="020B0509050000020004" pitchFamily="49" charset="0"/>
+                <a:ea typeface="Fira Code" panose="020B0509050000020004" pitchFamily="49" charset="0"/>
+              </a:rPr>
+              <a:t>I(x1^2)</a:t>
+            </a:r>
+            <a:r>
+              <a:rPr lang="en-GB" sz="5800" dirty="0">
+                <a:latin typeface="Fira Code" panose="020B0509050000020004" pitchFamily="49" charset="0"/>
+                <a:ea typeface="Fira Code" panose="020B0509050000020004" pitchFamily="49" charset="0"/>
+              </a:rPr>
+              <a:t> + (x1 + </a:t>
+            </a:r>
+            <a:r>
+              <a:rPr lang="en-GB" sz="5800" dirty="0" err="1">
+                <a:solidFill>
+                  <a:srgbClr val="F44336"/>
+                </a:solidFill>
+                <a:latin typeface="Fira Code" panose="020B0509050000020004" pitchFamily="49" charset="0"/>
+                <a:ea typeface="Fira Code" panose="020B0509050000020004" pitchFamily="49" charset="0"/>
+              </a:rPr>
+              <a:t>rs</a:t>
+            </a:r>
+            <a:r>
+              <a:rPr lang="en-GB" sz="5800" dirty="0">
+                <a:latin typeface="Fira Code" panose="020B0509050000020004" pitchFamily="49" charset="0"/>
+                <a:ea typeface="Fira Code" panose="020B0509050000020004" pitchFamily="49" charset="0"/>
+              </a:rPr>
+              <a:t> | </a:t>
+            </a:r>
+            <a:r>
+              <a:rPr lang="en-GB" sz="5800" dirty="0">
+                <a:solidFill>
+                  <a:srgbClr val="F44336"/>
+                </a:solidFill>
+                <a:latin typeface="Fira Code" panose="020B0509050000020004" pitchFamily="49" charset="0"/>
+                <a:ea typeface="Fira Code" panose="020B0509050000020004" pitchFamily="49" charset="0"/>
+              </a:rPr>
+              <a:t>g</a:t>
+            </a:r>
+            <a:r>
+              <a:rPr lang="en-GB" sz="5800" dirty="0">
+                <a:latin typeface="Fira Code" panose="020B0509050000020004" pitchFamily="49" charset="0"/>
+                <a:ea typeface="Fira Code" panose="020B0509050000020004" pitchFamily="49" charset="0"/>
+              </a:rPr>
+              <a:t>), data)</a:t>
+            </a:r>
+          </a:p>
+        </p:txBody>
+      </p:sp>
+      <p:sp>
+        <p:nvSpPr>
+          <p:cNvPr id="37" name="Rechteck 36">
+            <a:extLst>
+              <a:ext uri="{FF2B5EF4-FFF2-40B4-BE49-F238E27FC236}">
+                <a16:creationId xmlns:a16="http://schemas.microsoft.com/office/drawing/2014/main" id="{BD7576E8-FEC8-4947-8FE0-F2679A7A2017}"/>
+              </a:ext>
+            </a:extLst>
+          </p:cNvPr>
+          <p:cNvSpPr/>
+          <p:nvPr/>
+        </p:nvSpPr>
+        <p:spPr>
+          <a:xfrm>
+            <a:off x="9938502" y="1966336"/>
+            <a:ext cx="4243469" cy="769441"/>
+          </a:xfrm>
+          <a:prstGeom prst="rect">
+            <a:avLst/>
+          </a:prstGeom>
+        </p:spPr>
+        <p:txBody>
+          <a:bodyPr wrap="none">
+            <a:spAutoFit/>
+          </a:bodyPr>
+          <a:lstStyle/>
+          <a:p>
+            <a:r>
+              <a:rPr lang="en-GB" sz="4400" dirty="0" err="1" smtClean="0">
+                <a:solidFill>
+                  <a:srgbClr val="F44336"/>
+                </a:solidFill>
+                <a:latin typeface="Fira Code" panose="020B0509050000020004" pitchFamily="49" charset="0"/>
+                <a:ea typeface="Fira Code" panose="020B0509050000020004" pitchFamily="49" charset="0"/>
+              </a:rPr>
+              <a:t>find_terms</a:t>
+            </a:r>
+            <a:r>
+              <a:rPr lang="en-GB" sz="4400" dirty="0" smtClean="0">
+                <a:solidFill>
+                  <a:srgbClr val="F44336"/>
+                </a:solidFill>
+                <a:latin typeface="Fira Code" panose="020B0509050000020004" pitchFamily="49" charset="0"/>
+                <a:ea typeface="Fira Code" panose="020B0509050000020004" pitchFamily="49" charset="0"/>
+              </a:rPr>
+              <a:t>()</a:t>
+            </a:r>
+            <a:endParaRPr lang="en-GB" sz="4400" dirty="0">
+              <a:solidFill>
+                <a:srgbClr val="F44336"/>
+              </a:solidFill>
+              <a:latin typeface="Fira Code" panose="020B0509050000020004" pitchFamily="49" charset="0"/>
+              <a:ea typeface="Fira Code" panose="020B0509050000020004" pitchFamily="49" charset="0"/>
+            </a:endParaRPr>
+          </a:p>
+        </p:txBody>
+      </p:sp>
+    </p:spTree>
+    <p:extLst>
+      <p:ext uri="{BB962C8B-B14F-4D97-AF65-F5344CB8AC3E}">
+        <p14:creationId xmlns:p14="http://schemas.microsoft.com/office/powerpoint/2010/main" val="2921153720"/>
       </p:ext>
     </p:extLst>
   </p:cSld>

</xml_diff>